<commit_message>
chore: add the ipynb for rich menu
</commit_message>
<xml_diff>
--- a/src/assets/rich-menu/design.pptx
+++ b/src/assets/rich-menu/design.pptx
@@ -6,6 +6,9 @@
   </p:sldMasterIdLst>
   <p:sldIdLst>
     <p:sldId id="257" r:id="rId2"/>
+    <p:sldId id="258" r:id="rId3"/>
+    <p:sldId id="259" r:id="rId4"/>
+    <p:sldId id="260" r:id="rId5"/>
   </p:sldIdLst>
   <p:sldSz cx="12192000" cy="6858000"/>
   <p:notesSz cx="6858000" cy="9144000"/>
@@ -259,7 +262,7 @@
           <a:p>
             <a:fld id="{6D8FD6DF-9366-4717-9C4F-7011443901FF}" type="datetimeFigureOut">
               <a:rPr lang="zh-TW" altLang="en-US" smtClean="0"/>
-              <a:t>2023/5/22</a:t>
+              <a:t>2023/6/30</a:t>
             </a:fld>
             <a:endParaRPr lang="zh-TW" altLang="en-US"/>
           </a:p>
@@ -457,7 +460,7 @@
           <a:p>
             <a:fld id="{6D8FD6DF-9366-4717-9C4F-7011443901FF}" type="datetimeFigureOut">
               <a:rPr lang="zh-TW" altLang="en-US" smtClean="0"/>
-              <a:t>2023/5/22</a:t>
+              <a:t>2023/6/30</a:t>
             </a:fld>
             <a:endParaRPr lang="zh-TW" altLang="en-US"/>
           </a:p>
@@ -665,7 +668,7 @@
           <a:p>
             <a:fld id="{6D8FD6DF-9366-4717-9C4F-7011443901FF}" type="datetimeFigureOut">
               <a:rPr lang="zh-TW" altLang="en-US" smtClean="0"/>
-              <a:t>2023/5/22</a:t>
+              <a:t>2023/6/30</a:t>
             </a:fld>
             <a:endParaRPr lang="zh-TW" altLang="en-US"/>
           </a:p>
@@ -863,7 +866,7 @@
           <a:p>
             <a:fld id="{6D8FD6DF-9366-4717-9C4F-7011443901FF}" type="datetimeFigureOut">
               <a:rPr lang="zh-TW" altLang="en-US" smtClean="0"/>
-              <a:t>2023/5/22</a:t>
+              <a:t>2023/6/30</a:t>
             </a:fld>
             <a:endParaRPr lang="zh-TW" altLang="en-US"/>
           </a:p>
@@ -1138,7 +1141,7 @@
           <a:p>
             <a:fld id="{6D8FD6DF-9366-4717-9C4F-7011443901FF}" type="datetimeFigureOut">
               <a:rPr lang="zh-TW" altLang="en-US" smtClean="0"/>
-              <a:t>2023/5/22</a:t>
+              <a:t>2023/6/30</a:t>
             </a:fld>
             <a:endParaRPr lang="zh-TW" altLang="en-US"/>
           </a:p>
@@ -1403,7 +1406,7 @@
           <a:p>
             <a:fld id="{6D8FD6DF-9366-4717-9C4F-7011443901FF}" type="datetimeFigureOut">
               <a:rPr lang="zh-TW" altLang="en-US" smtClean="0"/>
-              <a:t>2023/5/22</a:t>
+              <a:t>2023/6/30</a:t>
             </a:fld>
             <a:endParaRPr lang="zh-TW" altLang="en-US"/>
           </a:p>
@@ -1815,7 +1818,7 @@
           <a:p>
             <a:fld id="{6D8FD6DF-9366-4717-9C4F-7011443901FF}" type="datetimeFigureOut">
               <a:rPr lang="zh-TW" altLang="en-US" smtClean="0"/>
-              <a:t>2023/5/22</a:t>
+              <a:t>2023/6/30</a:t>
             </a:fld>
             <a:endParaRPr lang="zh-TW" altLang="en-US"/>
           </a:p>
@@ -1956,7 +1959,7 @@
           <a:p>
             <a:fld id="{6D8FD6DF-9366-4717-9C4F-7011443901FF}" type="datetimeFigureOut">
               <a:rPr lang="zh-TW" altLang="en-US" smtClean="0"/>
-              <a:t>2023/5/22</a:t>
+              <a:t>2023/6/30</a:t>
             </a:fld>
             <a:endParaRPr lang="zh-TW" altLang="en-US"/>
           </a:p>
@@ -2069,7 +2072,7 @@
           <a:p>
             <a:fld id="{6D8FD6DF-9366-4717-9C4F-7011443901FF}" type="datetimeFigureOut">
               <a:rPr lang="zh-TW" altLang="en-US" smtClean="0"/>
-              <a:t>2023/5/22</a:t>
+              <a:t>2023/6/30</a:t>
             </a:fld>
             <a:endParaRPr lang="zh-TW" altLang="en-US"/>
           </a:p>
@@ -2380,7 +2383,7 @@
           <a:p>
             <a:fld id="{6D8FD6DF-9366-4717-9C4F-7011443901FF}" type="datetimeFigureOut">
               <a:rPr lang="zh-TW" altLang="en-US" smtClean="0"/>
-              <a:t>2023/5/22</a:t>
+              <a:t>2023/6/30</a:t>
             </a:fld>
             <a:endParaRPr lang="zh-TW" altLang="en-US"/>
           </a:p>
@@ -2668,7 +2671,7 @@
           <a:p>
             <a:fld id="{6D8FD6DF-9366-4717-9C4F-7011443901FF}" type="datetimeFigureOut">
               <a:rPr lang="zh-TW" altLang="en-US" smtClean="0"/>
-              <a:t>2023/5/22</a:t>
+              <a:t>2023/6/30</a:t>
             </a:fld>
             <a:endParaRPr lang="zh-TW" altLang="en-US"/>
           </a:p>
@@ -2909,7 +2912,7 @@
           <a:p>
             <a:fld id="{6D8FD6DF-9366-4717-9C4F-7011443901FF}" type="datetimeFigureOut">
               <a:rPr lang="zh-TW" altLang="en-US" smtClean="0"/>
-              <a:t>2023/5/22</a:t>
+              <a:t>2023/6/30</a:t>
             </a:fld>
             <a:endParaRPr lang="zh-TW" altLang="en-US"/>
           </a:p>
@@ -3328,7 +3331,7 @@
       </p:grpSpPr>
       <p:pic>
         <p:nvPicPr>
-          <p:cNvPr id="3" name="圖片 2" descr="一張含有 山, 室外, 天空, 大自然 的圖片&#10;&#10;自動產生的描述">
+          <p:cNvPr id="3" name="圖片 2">
             <a:extLst>
               <a:ext uri="{FF2B5EF4-FFF2-40B4-BE49-F238E27FC236}">
                 <a16:creationId xmlns:a16="http://schemas.microsoft.com/office/drawing/2014/main" id="{99F40E93-DB61-983B-1D6C-BA9717F6DC1D}"/>
@@ -3348,18 +3351,22 @@
               </a:ext>
             </a:extLst>
           </a:blip>
-          <a:stretch>
-            <a:fillRect/>
-          </a:stretch>
+          <a:srcRect/>
+          <a:stretch/>
         </p:blipFill>
         <p:spPr>
           <a:xfrm>
-            <a:off x="1" y="1373429"/>
-            <a:ext cx="12192000" cy="4111142"/>
+            <a:off x="2" y="1373429"/>
+            <a:ext cx="12191999" cy="4111142"/>
           </a:xfrm>
           <a:prstGeom prst="rect">
             <a:avLst/>
           </a:prstGeom>
+          <a:solidFill>
+            <a:schemeClr val="bg2">
+              <a:lumMod val="50000"/>
+            </a:schemeClr>
+          </a:solidFill>
         </p:spPr>
       </p:pic>
       <p:grpSp>
@@ -3376,7 +3383,7 @@
         </p:nvGrpSpPr>
         <p:grpSpPr>
           <a:xfrm>
-            <a:off x="303019" y="2179270"/>
+            <a:off x="3428316" y="2255470"/>
             <a:ext cx="3277967" cy="2868692"/>
             <a:chOff x="1395635" y="1989747"/>
             <a:chExt cx="3857327" cy="3375715"/>
@@ -3485,7 +3492,7 @@
         </p:nvGrpSpPr>
         <p:grpSpPr>
           <a:xfrm>
-            <a:off x="4522170" y="2083415"/>
+            <a:off x="7653080" y="2159615"/>
             <a:ext cx="3277967" cy="2964546"/>
             <a:chOff x="4608526" y="2083415"/>
             <a:chExt cx="3277967" cy="2964546"/>
@@ -3580,12 +3587,1085 @@
           </p:txBody>
         </p:sp>
       </p:grpSp>
+    </p:spTree>
+    <p:extLst>
+      <p:ext uri="{BB962C8B-B14F-4D97-AF65-F5344CB8AC3E}">
+        <p14:creationId xmlns:p14="http://schemas.microsoft.com/office/powerpoint/2010/main" val="2314412658"/>
+      </p:ext>
+    </p:extLst>
+  </p:cSld>
+  <p:clrMapOvr>
+    <a:masterClrMapping/>
+  </p:clrMapOvr>
+</p:sld>
+</file>
+
+<file path=ppt/slides/slide2.xml><?xml version="1.0" encoding="utf-8"?>
+<p:sld xmlns:a="http://schemas.openxmlformats.org/drawingml/2006/main" xmlns:r="http://schemas.openxmlformats.org/officeDocument/2006/relationships" xmlns:p="http://schemas.openxmlformats.org/presentationml/2006/main">
+  <p:cSld>
+    <p:spTree>
+      <p:nvGrpSpPr>
+        <p:cNvPr id="1" name=""/>
+        <p:cNvGrpSpPr/>
+        <p:nvPr/>
+      </p:nvGrpSpPr>
+      <p:grpSpPr>
+        <a:xfrm>
+          <a:off x="0" y="0"/>
+          <a:ext cx="0" cy="0"/>
+          <a:chOff x="0" y="0"/>
+          <a:chExt cx="0" cy="0"/>
+        </a:xfrm>
+      </p:grpSpPr>
+      <p:pic>
+        <p:nvPicPr>
+          <p:cNvPr id="15" name="圖片 14" descr="一張含有 行, 綠色, 圖表, 螢幕擷取畫面 的圖片&#10;&#10;自動產生的描述">
+            <a:extLst>
+              <a:ext uri="{FF2B5EF4-FFF2-40B4-BE49-F238E27FC236}">
+                <a16:creationId xmlns:a16="http://schemas.microsoft.com/office/drawing/2014/main" id="{BDF78EEE-BF2E-EC75-1F65-831C85742098}"/>
+              </a:ext>
+            </a:extLst>
+          </p:cNvPr>
+          <p:cNvPicPr>
+            <a:picLocks noChangeAspect="1"/>
+          </p:cNvPicPr>
+          <p:nvPr/>
+        </p:nvPicPr>
+        <p:blipFill>
+          <a:blip r:embed="rId2">
+            <a:extLst>
+              <a:ext uri="{28A0092B-C50C-407E-A947-70E740481C1C}">
+                <a14:useLocalDpi xmlns:a14="http://schemas.microsoft.com/office/drawing/2010/main" val="0"/>
+              </a:ext>
+            </a:extLst>
+          </a:blip>
+          <a:stretch>
+            <a:fillRect/>
+          </a:stretch>
+        </p:blipFill>
+        <p:spPr>
+          <a:xfrm>
+            <a:off x="0" y="1515084"/>
+            <a:ext cx="12192000" cy="4111142"/>
+          </a:xfrm>
+          <a:prstGeom prst="rect">
+            <a:avLst/>
+          </a:prstGeom>
+        </p:spPr>
+      </p:pic>
+      <p:sp>
+        <p:nvSpPr>
+          <p:cNvPr id="22" name="矩形 21">
+            <a:extLst>
+              <a:ext uri="{FF2B5EF4-FFF2-40B4-BE49-F238E27FC236}">
+                <a16:creationId xmlns:a16="http://schemas.microsoft.com/office/drawing/2014/main" id="{22AF012F-5BFE-E55E-6D3B-217BCDD846C4}"/>
+              </a:ext>
+            </a:extLst>
+          </p:cNvPr>
+          <p:cNvSpPr/>
+          <p:nvPr/>
+        </p:nvSpPr>
+        <p:spPr>
+          <a:xfrm>
+            <a:off x="0" y="1515084"/>
+            <a:ext cx="12192000" cy="4111142"/>
+          </a:xfrm>
+          <a:prstGeom prst="rect">
+            <a:avLst/>
+          </a:prstGeom>
+          <a:solidFill>
+            <a:srgbClr val="F3C581"/>
+          </a:solidFill>
+          <a:ln>
+            <a:noFill/>
+          </a:ln>
+        </p:spPr>
+        <p:style>
+          <a:lnRef idx="2">
+            <a:schemeClr val="accent1">
+              <a:shade val="15000"/>
+            </a:schemeClr>
+          </a:lnRef>
+          <a:fillRef idx="1">
+            <a:schemeClr val="accent1"/>
+          </a:fillRef>
+          <a:effectRef idx="0">
+            <a:schemeClr val="accent1"/>
+          </a:effectRef>
+          <a:fontRef idx="minor">
+            <a:schemeClr val="lt1"/>
+          </a:fontRef>
+        </p:style>
+        <p:txBody>
+          <a:bodyPr rtlCol="0" anchor="ctr"/>
+          <a:lstStyle/>
+          <a:p>
+            <a:pPr algn="ctr"/>
+            <a:endParaRPr lang="zh-TW" altLang="en-US"/>
+          </a:p>
+        </p:txBody>
+      </p:sp>
+      <p:sp>
+        <p:nvSpPr>
+          <p:cNvPr id="2" name="矩形: 圓角 1">
+            <a:extLst>
+              <a:ext uri="{FF2B5EF4-FFF2-40B4-BE49-F238E27FC236}">
+                <a16:creationId xmlns:a16="http://schemas.microsoft.com/office/drawing/2014/main" id="{B0CC54CA-D4E0-B710-663C-7D168B0267AE}"/>
+              </a:ext>
+            </a:extLst>
+          </p:cNvPr>
+          <p:cNvSpPr>
+            <a:spLocks noChangeAspect="1"/>
+          </p:cNvSpPr>
+          <p:nvPr/>
+        </p:nvSpPr>
+        <p:spPr>
+          <a:xfrm>
+            <a:off x="27054" y="1590655"/>
+            <a:ext cx="3960000" cy="3960000"/>
+          </a:xfrm>
+          <a:prstGeom prst="roundRect">
+            <a:avLst>
+              <a:gd name="adj" fmla="val 8179"/>
+            </a:avLst>
+          </a:prstGeom>
+          <a:solidFill>
+            <a:srgbClr val="7A4514"/>
+          </a:solidFill>
+          <a:ln>
+            <a:noFill/>
+          </a:ln>
+        </p:spPr>
+        <p:style>
+          <a:lnRef idx="2">
+            <a:schemeClr val="accent4"/>
+          </a:lnRef>
+          <a:fillRef idx="1">
+            <a:schemeClr val="lt1"/>
+          </a:fillRef>
+          <a:effectRef idx="0">
+            <a:schemeClr val="accent4"/>
+          </a:effectRef>
+          <a:fontRef idx="minor">
+            <a:schemeClr val="dk1"/>
+          </a:fontRef>
+        </p:style>
+        <p:txBody>
+          <a:bodyPr rtlCol="0" anchor="ctr"/>
+          <a:lstStyle/>
+          <a:p>
+            <a:pPr algn="ctr"/>
+            <a:endParaRPr lang="zh-TW" altLang="en-US">
+              <a:solidFill>
+                <a:srgbClr val="2F5597"/>
+              </a:solidFill>
+            </a:endParaRPr>
+          </a:p>
+        </p:txBody>
+      </p:sp>
+      <p:pic>
+        <p:nvPicPr>
+          <p:cNvPr id="6" name="圖形 5">
+            <a:extLst>
+              <a:ext uri="{FF2B5EF4-FFF2-40B4-BE49-F238E27FC236}">
+                <a16:creationId xmlns:a16="http://schemas.microsoft.com/office/drawing/2014/main" id="{3F027850-747F-1092-A9D0-1EECDAA60342}"/>
+              </a:ext>
+            </a:extLst>
+          </p:cNvPr>
+          <p:cNvPicPr>
+            <a:picLocks noChangeAspect="1"/>
+          </p:cNvPicPr>
+          <p:nvPr/>
+        </p:nvPicPr>
+        <p:blipFill>
+          <a:blip r:embed="rId3">
+            <a:extLst>
+              <a:ext uri="{28A0092B-C50C-407E-A947-70E740481C1C}">
+                <a14:useLocalDpi xmlns:a14="http://schemas.microsoft.com/office/drawing/2010/main" val="0"/>
+              </a:ext>
+              <a:ext uri="{96DAC541-7B7A-43D3-8B79-37D633B846F1}">
+                <asvg:svgBlip xmlns:asvg="http://schemas.microsoft.com/office/drawing/2016/SVG/main" r:embed="rId4"/>
+              </a:ext>
+            </a:extLst>
+          </a:blip>
+          <a:stretch>
+            <a:fillRect/>
+          </a:stretch>
+        </p:blipFill>
+        <p:spPr>
+          <a:xfrm>
+            <a:off x="1005101" y="2258225"/>
+            <a:ext cx="2164977" cy="2164977"/>
+          </a:xfrm>
+          <a:prstGeom prst="rect">
+            <a:avLst/>
+          </a:prstGeom>
+        </p:spPr>
+      </p:pic>
+      <p:sp>
+        <p:nvSpPr>
+          <p:cNvPr id="18" name="矩形: 圓角 17">
+            <a:extLst>
+              <a:ext uri="{FF2B5EF4-FFF2-40B4-BE49-F238E27FC236}">
+                <a16:creationId xmlns:a16="http://schemas.microsoft.com/office/drawing/2014/main" id="{9DC7F1B5-01D6-A494-8903-A04651EBDD0E}"/>
+              </a:ext>
+            </a:extLst>
+          </p:cNvPr>
+          <p:cNvSpPr>
+            <a:spLocks noChangeAspect="1"/>
+          </p:cNvSpPr>
+          <p:nvPr/>
+        </p:nvSpPr>
+        <p:spPr>
+          <a:xfrm>
+            <a:off x="4110928" y="1590655"/>
+            <a:ext cx="3960000" cy="3960000"/>
+          </a:xfrm>
+          <a:prstGeom prst="roundRect">
+            <a:avLst>
+              <a:gd name="adj" fmla="val 8179"/>
+            </a:avLst>
+          </a:prstGeom>
+          <a:ln>
+            <a:noFill/>
+          </a:ln>
+        </p:spPr>
+        <p:style>
+          <a:lnRef idx="2">
+            <a:schemeClr val="accent4"/>
+          </a:lnRef>
+          <a:fillRef idx="1">
+            <a:schemeClr val="lt1"/>
+          </a:fillRef>
+          <a:effectRef idx="0">
+            <a:schemeClr val="accent4"/>
+          </a:effectRef>
+          <a:fontRef idx="minor">
+            <a:schemeClr val="dk1"/>
+          </a:fontRef>
+        </p:style>
+        <p:txBody>
+          <a:bodyPr rtlCol="0" anchor="ctr"/>
+          <a:lstStyle/>
+          <a:p>
+            <a:pPr algn="ctr"/>
+            <a:endParaRPr lang="zh-TW" altLang="en-US"/>
+          </a:p>
+        </p:txBody>
+      </p:sp>
+      <p:sp>
+        <p:nvSpPr>
+          <p:cNvPr id="19" name="矩形: 圓角 18">
+            <a:extLst>
+              <a:ext uri="{FF2B5EF4-FFF2-40B4-BE49-F238E27FC236}">
+                <a16:creationId xmlns:a16="http://schemas.microsoft.com/office/drawing/2014/main" id="{B8F37924-2EC1-C582-29FF-EDE843F7AE2B}"/>
+              </a:ext>
+            </a:extLst>
+          </p:cNvPr>
+          <p:cNvSpPr>
+            <a:spLocks noChangeAspect="1"/>
+          </p:cNvSpPr>
+          <p:nvPr/>
+        </p:nvSpPr>
+        <p:spPr>
+          <a:xfrm>
+            <a:off x="8204946" y="1581228"/>
+            <a:ext cx="3960000" cy="3960000"/>
+          </a:xfrm>
+          <a:prstGeom prst="roundRect">
+            <a:avLst>
+              <a:gd name="adj" fmla="val 8179"/>
+            </a:avLst>
+          </a:prstGeom>
+          <a:solidFill>
+            <a:srgbClr val="CB7323"/>
+          </a:solidFill>
+          <a:ln>
+            <a:noFill/>
+          </a:ln>
+        </p:spPr>
+        <p:style>
+          <a:lnRef idx="2">
+            <a:schemeClr val="accent4"/>
+          </a:lnRef>
+          <a:fillRef idx="1">
+            <a:schemeClr val="lt1"/>
+          </a:fillRef>
+          <a:effectRef idx="0">
+            <a:schemeClr val="accent4"/>
+          </a:effectRef>
+          <a:fontRef idx="minor">
+            <a:schemeClr val="dk1"/>
+          </a:fontRef>
+        </p:style>
+        <p:txBody>
+          <a:bodyPr rtlCol="0" anchor="ctr"/>
+          <a:lstStyle/>
+          <a:p>
+            <a:pPr algn="ctr"/>
+            <a:endParaRPr lang="zh-TW" altLang="en-US"/>
+          </a:p>
+        </p:txBody>
+      </p:sp>
+      <p:pic>
+        <p:nvPicPr>
+          <p:cNvPr id="8" name="圖形 7">
+            <a:extLst>
+              <a:ext uri="{FF2B5EF4-FFF2-40B4-BE49-F238E27FC236}">
+                <a16:creationId xmlns:a16="http://schemas.microsoft.com/office/drawing/2014/main" id="{6F4C18F0-023E-F579-BB1F-95534813E727}"/>
+              </a:ext>
+            </a:extLst>
+          </p:cNvPr>
+          <p:cNvPicPr>
+            <a:picLocks noChangeAspect="1"/>
+          </p:cNvPicPr>
+          <p:nvPr/>
+        </p:nvPicPr>
+        <p:blipFill>
+          <a:blip r:embed="rId5">
+            <a:extLst>
+              <a:ext uri="{28A0092B-C50C-407E-A947-70E740481C1C}">
+                <a14:useLocalDpi xmlns:a14="http://schemas.microsoft.com/office/drawing/2010/main" val="0"/>
+              </a:ext>
+              <a:ext uri="{96DAC541-7B7A-43D3-8B79-37D633B846F1}">
+                <asvg:svgBlip xmlns:asvg="http://schemas.microsoft.com/office/drawing/2016/SVG/main" r:embed="rId6"/>
+              </a:ext>
+            </a:extLst>
+          </a:blip>
+          <a:stretch>
+            <a:fillRect/>
+          </a:stretch>
+        </p:blipFill>
+        <p:spPr>
+          <a:xfrm>
+            <a:off x="9068839" y="2258225"/>
+            <a:ext cx="2232212" cy="2232212"/>
+          </a:xfrm>
+          <a:prstGeom prst="rect">
+            <a:avLst/>
+          </a:prstGeom>
+        </p:spPr>
+      </p:pic>
+      <p:pic>
+        <p:nvPicPr>
+          <p:cNvPr id="4" name="圖形 3">
+            <a:extLst>
+              <a:ext uri="{FF2B5EF4-FFF2-40B4-BE49-F238E27FC236}">
+                <a16:creationId xmlns:a16="http://schemas.microsoft.com/office/drawing/2014/main" id="{DD78FA61-5221-EC8E-246B-9AA0FD4B778D}"/>
+              </a:ext>
+            </a:extLst>
+          </p:cNvPr>
+          <p:cNvPicPr>
+            <a:picLocks noChangeAspect="1"/>
+          </p:cNvPicPr>
+          <p:nvPr/>
+        </p:nvPicPr>
+        <p:blipFill>
+          <a:blip r:embed="rId7">
+            <a:extLst>
+              <a:ext uri="{28A0092B-C50C-407E-A947-70E740481C1C}">
+                <a14:useLocalDpi xmlns:a14="http://schemas.microsoft.com/office/drawing/2010/main" val="0"/>
+              </a:ext>
+              <a:ext uri="{96DAC541-7B7A-43D3-8B79-37D633B846F1}">
+                <asvg:svgBlip xmlns:asvg="http://schemas.microsoft.com/office/drawing/2016/SVG/main" r:embed="rId8"/>
+              </a:ext>
+            </a:extLst>
+          </a:blip>
+          <a:stretch>
+            <a:fillRect/>
+          </a:stretch>
+        </p:blipFill>
+        <p:spPr>
+          <a:xfrm>
+            <a:off x="4965101" y="2258225"/>
+            <a:ext cx="2164977" cy="2164977"/>
+          </a:xfrm>
+          <a:prstGeom prst="rect">
+            <a:avLst/>
+          </a:prstGeom>
+        </p:spPr>
+      </p:pic>
+      <p:sp>
+        <p:nvSpPr>
+          <p:cNvPr id="13" name="文字方塊 12">
+            <a:extLst>
+              <a:ext uri="{FF2B5EF4-FFF2-40B4-BE49-F238E27FC236}">
+                <a16:creationId xmlns:a16="http://schemas.microsoft.com/office/drawing/2014/main" id="{43DE5DB1-6B64-D373-7EB5-C5D4BFBCBF92}"/>
+              </a:ext>
+            </a:extLst>
+          </p:cNvPr>
+          <p:cNvSpPr txBox="1"/>
+          <p:nvPr/>
+        </p:nvSpPr>
+        <p:spPr>
+          <a:xfrm>
+            <a:off x="8683357" y="4632974"/>
+            <a:ext cx="3003177" cy="646331"/>
+          </a:xfrm>
+          <a:prstGeom prst="rect">
+            <a:avLst/>
+          </a:prstGeom>
+          <a:noFill/>
+        </p:spPr>
+        <p:txBody>
+          <a:bodyPr wrap="square">
+            <a:spAutoFit/>
+          </a:bodyPr>
+          <a:lstStyle/>
+          <a:p>
+            <a:pPr algn="dist"/>
+            <a:r>
+              <a:rPr lang="zh-TW" altLang="en-US" sz="3600" b="1" dirty="0">
+                <a:ln w="3175">
+                  <a:noFill/>
+                </a:ln>
+                <a:solidFill>
+                  <a:schemeClr val="bg1"/>
+                </a:solidFill>
+                <a:latin typeface="Microsoft YaHei UI" panose="020B0503020204020204" pitchFamily="34" charset="-122"/>
+                <a:ea typeface="Microsoft YaHei UI" panose="020B0503020204020204" pitchFamily="34" charset="-122"/>
+              </a:rPr>
+              <a:t>日常巡檢時數</a:t>
+            </a:r>
+          </a:p>
+        </p:txBody>
+      </p:sp>
+      <p:sp>
+        <p:nvSpPr>
+          <p:cNvPr id="20" name="文字方塊 19">
+            <a:extLst>
+              <a:ext uri="{FF2B5EF4-FFF2-40B4-BE49-F238E27FC236}">
+                <a16:creationId xmlns:a16="http://schemas.microsoft.com/office/drawing/2014/main" id="{CAF2E575-7779-F1A8-608D-3B2DCC9F8A66}"/>
+              </a:ext>
+            </a:extLst>
+          </p:cNvPr>
+          <p:cNvSpPr txBox="1"/>
+          <p:nvPr/>
+        </p:nvSpPr>
+        <p:spPr>
+          <a:xfrm>
+            <a:off x="4589339" y="4632974"/>
+            <a:ext cx="3003177" cy="646331"/>
+          </a:xfrm>
+          <a:prstGeom prst="rect">
+            <a:avLst/>
+          </a:prstGeom>
+          <a:noFill/>
+        </p:spPr>
+        <p:txBody>
+          <a:bodyPr wrap="square">
+            <a:spAutoFit/>
+          </a:bodyPr>
+          <a:lstStyle/>
+          <a:p>
+            <a:pPr algn="dist"/>
+            <a:r>
+              <a:rPr lang="zh-TW" altLang="en-US" sz="3600" b="1" dirty="0">
+                <a:ln w="3175">
+                  <a:noFill/>
+                </a:ln>
+                <a:solidFill>
+                  <a:srgbClr val="7A4514"/>
+                </a:solidFill>
+                <a:latin typeface="Microsoft YaHei UI" panose="020B0503020204020204" pitchFamily="34" charset="-122"/>
+                <a:ea typeface="Microsoft YaHei UI" panose="020B0503020204020204" pitchFamily="34" charset="-122"/>
+              </a:rPr>
+              <a:t>近期通報查詢</a:t>
+            </a:r>
+          </a:p>
+        </p:txBody>
+      </p:sp>
+      <p:sp>
+        <p:nvSpPr>
+          <p:cNvPr id="21" name="文字方塊 20">
+            <a:extLst>
+              <a:ext uri="{FF2B5EF4-FFF2-40B4-BE49-F238E27FC236}">
+                <a16:creationId xmlns:a16="http://schemas.microsoft.com/office/drawing/2014/main" id="{99874841-518C-A061-2AD7-DF65EC0C732E}"/>
+              </a:ext>
+            </a:extLst>
+          </p:cNvPr>
+          <p:cNvSpPr txBox="1"/>
+          <p:nvPr/>
+        </p:nvSpPr>
+        <p:spPr>
+          <a:xfrm>
+            <a:off x="505465" y="4632974"/>
+            <a:ext cx="3003177" cy="646331"/>
+          </a:xfrm>
+          <a:prstGeom prst="rect">
+            <a:avLst/>
+          </a:prstGeom>
+          <a:noFill/>
+        </p:spPr>
+        <p:txBody>
+          <a:bodyPr wrap="square">
+            <a:spAutoFit/>
+          </a:bodyPr>
+          <a:lstStyle/>
+          <a:p>
+            <a:pPr algn="dist"/>
+            <a:r>
+              <a:rPr lang="zh-TW" altLang="en-US" sz="3600" b="1" dirty="0">
+                <a:ln w="3175">
+                  <a:noFill/>
+                </a:ln>
+                <a:solidFill>
+                  <a:schemeClr val="bg1"/>
+                </a:solidFill>
+                <a:latin typeface="Microsoft YaHei UI" panose="020B0503020204020204" pitchFamily="34" charset="-122"/>
+                <a:ea typeface="Microsoft YaHei UI" panose="020B0503020204020204" pitchFamily="34" charset="-122"/>
+              </a:rPr>
+              <a:t>年度通報查詢</a:t>
+            </a:r>
+          </a:p>
+        </p:txBody>
+      </p:sp>
+    </p:spTree>
+    <p:extLst>
+      <p:ext uri="{BB962C8B-B14F-4D97-AF65-F5344CB8AC3E}">
+        <p14:creationId xmlns:p14="http://schemas.microsoft.com/office/powerpoint/2010/main" val="3691713372"/>
+      </p:ext>
+    </p:extLst>
+  </p:cSld>
+  <p:clrMapOvr>
+    <a:masterClrMapping/>
+  </p:clrMapOvr>
+</p:sld>
+</file>
+
+<file path=ppt/slides/slide3.xml><?xml version="1.0" encoding="utf-8"?>
+<p:sld xmlns:a="http://schemas.openxmlformats.org/drawingml/2006/main" xmlns:r="http://schemas.openxmlformats.org/officeDocument/2006/relationships" xmlns:p="http://schemas.openxmlformats.org/presentationml/2006/main">
+  <p:cSld>
+    <p:spTree>
+      <p:nvGrpSpPr>
+        <p:cNvPr id="1" name=""/>
+        <p:cNvGrpSpPr/>
+        <p:nvPr/>
+      </p:nvGrpSpPr>
+      <p:grpSpPr>
+        <a:xfrm>
+          <a:off x="0" y="0"/>
+          <a:ext cx="0" cy="0"/>
+          <a:chOff x="0" y="0"/>
+          <a:chExt cx="0" cy="0"/>
+        </a:xfrm>
+      </p:grpSpPr>
+      <p:pic>
+        <p:nvPicPr>
+          <p:cNvPr id="15" name="圖片 14" descr="一張含有 行, 綠色, 圖表, 螢幕擷取畫面 的圖片&#10;&#10;自動產生的描述">
+            <a:extLst>
+              <a:ext uri="{FF2B5EF4-FFF2-40B4-BE49-F238E27FC236}">
+                <a16:creationId xmlns:a16="http://schemas.microsoft.com/office/drawing/2014/main" id="{BDF78EEE-BF2E-EC75-1F65-831C85742098}"/>
+              </a:ext>
+            </a:extLst>
+          </p:cNvPr>
+          <p:cNvPicPr>
+            <a:picLocks noChangeAspect="1"/>
+          </p:cNvPicPr>
+          <p:nvPr/>
+        </p:nvPicPr>
+        <p:blipFill>
+          <a:blip r:embed="rId2">
+            <a:extLst>
+              <a:ext uri="{28A0092B-C50C-407E-A947-70E740481C1C}">
+                <a14:useLocalDpi xmlns:a14="http://schemas.microsoft.com/office/drawing/2010/main" val="0"/>
+              </a:ext>
+            </a:extLst>
+          </a:blip>
+          <a:stretch>
+            <a:fillRect/>
+          </a:stretch>
+        </p:blipFill>
+        <p:spPr>
+          <a:xfrm>
+            <a:off x="0" y="1515084"/>
+            <a:ext cx="12192000" cy="4111142"/>
+          </a:xfrm>
+          <a:prstGeom prst="rect">
+            <a:avLst/>
+          </a:prstGeom>
+        </p:spPr>
+      </p:pic>
+      <p:sp>
+        <p:nvSpPr>
+          <p:cNvPr id="22" name="矩形 21">
+            <a:extLst>
+              <a:ext uri="{FF2B5EF4-FFF2-40B4-BE49-F238E27FC236}">
+                <a16:creationId xmlns:a16="http://schemas.microsoft.com/office/drawing/2014/main" id="{22AF012F-5BFE-E55E-6D3B-217BCDD846C4}"/>
+              </a:ext>
+            </a:extLst>
+          </p:cNvPr>
+          <p:cNvSpPr/>
+          <p:nvPr/>
+        </p:nvSpPr>
+        <p:spPr>
+          <a:xfrm>
+            <a:off x="0" y="1515084"/>
+            <a:ext cx="12192000" cy="4111142"/>
+          </a:xfrm>
+          <a:prstGeom prst="rect">
+            <a:avLst/>
+          </a:prstGeom>
+          <a:solidFill>
+            <a:schemeClr val="accent2"/>
+          </a:solidFill>
+          <a:ln>
+            <a:noFill/>
+          </a:ln>
+        </p:spPr>
+        <p:style>
+          <a:lnRef idx="2">
+            <a:schemeClr val="accent1">
+              <a:shade val="15000"/>
+            </a:schemeClr>
+          </a:lnRef>
+          <a:fillRef idx="1">
+            <a:schemeClr val="accent1"/>
+          </a:fillRef>
+          <a:effectRef idx="0">
+            <a:schemeClr val="accent1"/>
+          </a:effectRef>
+          <a:fontRef idx="minor">
+            <a:schemeClr val="lt1"/>
+          </a:fontRef>
+        </p:style>
+        <p:txBody>
+          <a:bodyPr rtlCol="0" anchor="ctr"/>
+          <a:lstStyle/>
+          <a:p>
+            <a:pPr algn="ctr"/>
+            <a:endParaRPr lang="zh-TW" altLang="en-US"/>
+          </a:p>
+        </p:txBody>
+      </p:sp>
+      <p:sp>
+        <p:nvSpPr>
+          <p:cNvPr id="2" name="矩形: 圓角 1">
+            <a:extLst>
+              <a:ext uri="{FF2B5EF4-FFF2-40B4-BE49-F238E27FC236}">
+                <a16:creationId xmlns:a16="http://schemas.microsoft.com/office/drawing/2014/main" id="{B0CC54CA-D4E0-B710-663C-7D168B0267AE}"/>
+              </a:ext>
+            </a:extLst>
+          </p:cNvPr>
+          <p:cNvSpPr>
+            <a:spLocks noChangeAspect="1"/>
+          </p:cNvSpPr>
+          <p:nvPr/>
+        </p:nvSpPr>
+        <p:spPr>
+          <a:xfrm>
+            <a:off x="27054" y="1590655"/>
+            <a:ext cx="3960000" cy="3960000"/>
+          </a:xfrm>
+          <a:prstGeom prst="roundRect">
+            <a:avLst>
+              <a:gd name="adj" fmla="val 8179"/>
+            </a:avLst>
+          </a:prstGeom>
+          <a:solidFill>
+            <a:schemeClr val="bg1"/>
+          </a:solidFill>
+          <a:ln>
+            <a:noFill/>
+          </a:ln>
+        </p:spPr>
+        <p:style>
+          <a:lnRef idx="2">
+            <a:schemeClr val="accent4"/>
+          </a:lnRef>
+          <a:fillRef idx="1">
+            <a:schemeClr val="lt1"/>
+          </a:fillRef>
+          <a:effectRef idx="0">
+            <a:schemeClr val="accent4"/>
+          </a:effectRef>
+          <a:fontRef idx="minor">
+            <a:schemeClr val="dk1"/>
+          </a:fontRef>
+        </p:style>
+        <p:txBody>
+          <a:bodyPr rtlCol="0" anchor="ctr"/>
+          <a:lstStyle/>
+          <a:p>
+            <a:pPr algn="ctr"/>
+            <a:endParaRPr lang="zh-TW" altLang="en-US">
+              <a:solidFill>
+                <a:srgbClr val="2F5597"/>
+              </a:solidFill>
+            </a:endParaRPr>
+          </a:p>
+        </p:txBody>
+      </p:sp>
+      <p:sp>
+        <p:nvSpPr>
+          <p:cNvPr id="18" name="矩形: 圓角 17">
+            <a:extLst>
+              <a:ext uri="{FF2B5EF4-FFF2-40B4-BE49-F238E27FC236}">
+                <a16:creationId xmlns:a16="http://schemas.microsoft.com/office/drawing/2014/main" id="{9DC7F1B5-01D6-A494-8903-A04651EBDD0E}"/>
+              </a:ext>
+            </a:extLst>
+          </p:cNvPr>
+          <p:cNvSpPr>
+            <a:spLocks noChangeAspect="1"/>
+          </p:cNvSpPr>
+          <p:nvPr/>
+        </p:nvSpPr>
+        <p:spPr>
+          <a:xfrm>
+            <a:off x="4110928" y="1590655"/>
+            <a:ext cx="3960000" cy="3960000"/>
+          </a:xfrm>
+          <a:prstGeom prst="roundRect">
+            <a:avLst>
+              <a:gd name="adj" fmla="val 8179"/>
+            </a:avLst>
+          </a:prstGeom>
+          <a:solidFill>
+            <a:srgbClr val="7A4514"/>
+          </a:solidFill>
+          <a:ln>
+            <a:noFill/>
+          </a:ln>
+        </p:spPr>
+        <p:style>
+          <a:lnRef idx="2">
+            <a:schemeClr val="accent4"/>
+          </a:lnRef>
+          <a:fillRef idx="1">
+            <a:schemeClr val="lt1"/>
+          </a:fillRef>
+          <a:effectRef idx="0">
+            <a:schemeClr val="accent4"/>
+          </a:effectRef>
+          <a:fontRef idx="minor">
+            <a:schemeClr val="dk1"/>
+          </a:fontRef>
+        </p:style>
+        <p:txBody>
+          <a:bodyPr rtlCol="0" anchor="ctr"/>
+          <a:lstStyle/>
+          <a:p>
+            <a:pPr algn="ctr"/>
+            <a:endParaRPr lang="zh-TW" altLang="en-US"/>
+          </a:p>
+        </p:txBody>
+      </p:sp>
+      <p:sp>
+        <p:nvSpPr>
+          <p:cNvPr id="19" name="矩形: 圓角 18">
+            <a:extLst>
+              <a:ext uri="{FF2B5EF4-FFF2-40B4-BE49-F238E27FC236}">
+                <a16:creationId xmlns:a16="http://schemas.microsoft.com/office/drawing/2014/main" id="{B8F37924-2EC1-C582-29FF-EDE843F7AE2B}"/>
+              </a:ext>
+            </a:extLst>
+          </p:cNvPr>
+          <p:cNvSpPr>
+            <a:spLocks noChangeAspect="1"/>
+          </p:cNvSpPr>
+          <p:nvPr/>
+        </p:nvSpPr>
+        <p:spPr>
+          <a:xfrm>
+            <a:off x="8204946" y="1581228"/>
+            <a:ext cx="3960000" cy="3960000"/>
+          </a:xfrm>
+          <a:prstGeom prst="roundRect">
+            <a:avLst>
+              <a:gd name="adj" fmla="val 8179"/>
+            </a:avLst>
+          </a:prstGeom>
+          <a:solidFill>
+            <a:schemeClr val="bg1"/>
+          </a:solidFill>
+          <a:ln>
+            <a:noFill/>
+          </a:ln>
+        </p:spPr>
+        <p:style>
+          <a:lnRef idx="2">
+            <a:schemeClr val="accent4"/>
+          </a:lnRef>
+          <a:fillRef idx="1">
+            <a:schemeClr val="lt1"/>
+          </a:fillRef>
+          <a:effectRef idx="0">
+            <a:schemeClr val="accent4"/>
+          </a:effectRef>
+          <a:fontRef idx="minor">
+            <a:schemeClr val="dk1"/>
+          </a:fontRef>
+        </p:style>
+        <p:txBody>
+          <a:bodyPr rtlCol="0" anchor="ctr"/>
+          <a:lstStyle/>
+          <a:p>
+            <a:pPr algn="ctr"/>
+            <a:endParaRPr lang="zh-TW" altLang="en-US"/>
+          </a:p>
+        </p:txBody>
+      </p:sp>
+      <p:pic>
+        <p:nvPicPr>
+          <p:cNvPr id="4" name="圖形 3">
+            <a:extLst>
+              <a:ext uri="{FF2B5EF4-FFF2-40B4-BE49-F238E27FC236}">
+                <a16:creationId xmlns:a16="http://schemas.microsoft.com/office/drawing/2014/main" id="{DD78FA61-5221-EC8E-246B-9AA0FD4B778D}"/>
+              </a:ext>
+            </a:extLst>
+          </p:cNvPr>
+          <p:cNvPicPr>
+            <a:picLocks noChangeAspect="1"/>
+          </p:cNvPicPr>
+          <p:nvPr/>
+        </p:nvPicPr>
+        <p:blipFill>
+          <a:blip r:embed="rId3">
+            <a:extLst>
+              <a:ext uri="{28A0092B-C50C-407E-A947-70E740481C1C}">
+                <a14:useLocalDpi xmlns:a14="http://schemas.microsoft.com/office/drawing/2010/main" val="0"/>
+              </a:ext>
+              <a:ext uri="{96DAC541-7B7A-43D3-8B79-37D633B846F1}">
+                <asvg:svgBlip xmlns:asvg="http://schemas.microsoft.com/office/drawing/2016/SVG/main" r:embed="rId4"/>
+              </a:ext>
+            </a:extLst>
+          </a:blip>
+          <a:stretch>
+            <a:fillRect/>
+          </a:stretch>
+        </p:blipFill>
+        <p:spPr>
+          <a:xfrm>
+            <a:off x="4965101" y="2258225"/>
+            <a:ext cx="2164977" cy="2164977"/>
+          </a:xfrm>
+          <a:prstGeom prst="rect">
+            <a:avLst/>
+          </a:prstGeom>
+        </p:spPr>
+      </p:pic>
+      <p:sp>
+        <p:nvSpPr>
+          <p:cNvPr id="13" name="文字方塊 12">
+            <a:extLst>
+              <a:ext uri="{FF2B5EF4-FFF2-40B4-BE49-F238E27FC236}">
+                <a16:creationId xmlns:a16="http://schemas.microsoft.com/office/drawing/2014/main" id="{43DE5DB1-6B64-D373-7EB5-C5D4BFBCBF92}"/>
+              </a:ext>
+            </a:extLst>
+          </p:cNvPr>
+          <p:cNvSpPr txBox="1"/>
+          <p:nvPr/>
+        </p:nvSpPr>
+        <p:spPr>
+          <a:xfrm>
+            <a:off x="8683357" y="4632974"/>
+            <a:ext cx="3003177" cy="646331"/>
+          </a:xfrm>
+          <a:prstGeom prst="rect">
+            <a:avLst/>
+          </a:prstGeom>
+          <a:noFill/>
+        </p:spPr>
+        <p:txBody>
+          <a:bodyPr wrap="square">
+            <a:spAutoFit/>
+          </a:bodyPr>
+          <a:lstStyle/>
+          <a:p>
+            <a:pPr algn="dist"/>
+            <a:r>
+              <a:rPr lang="zh-TW" altLang="en-US" sz="3600" b="1" dirty="0">
+                <a:ln w="3175">
+                  <a:noFill/>
+                </a:ln>
+                <a:solidFill>
+                  <a:schemeClr val="accent1">
+                    <a:lumMod val="50000"/>
+                  </a:schemeClr>
+                </a:solidFill>
+                <a:latin typeface="Microsoft YaHei UI" panose="020B0503020204020204" pitchFamily="34" charset="-122"/>
+                <a:ea typeface="Microsoft YaHei UI" panose="020B0503020204020204" pitchFamily="34" charset="-122"/>
+              </a:rPr>
+              <a:t>日常巡檢時數</a:t>
+            </a:r>
+          </a:p>
+        </p:txBody>
+      </p:sp>
+      <p:sp>
+        <p:nvSpPr>
+          <p:cNvPr id="20" name="文字方塊 19">
+            <a:extLst>
+              <a:ext uri="{FF2B5EF4-FFF2-40B4-BE49-F238E27FC236}">
+                <a16:creationId xmlns:a16="http://schemas.microsoft.com/office/drawing/2014/main" id="{CAF2E575-7779-F1A8-608D-3B2DCC9F8A66}"/>
+              </a:ext>
+            </a:extLst>
+          </p:cNvPr>
+          <p:cNvSpPr txBox="1"/>
+          <p:nvPr/>
+        </p:nvSpPr>
+        <p:spPr>
+          <a:xfrm>
+            <a:off x="4589339" y="4632974"/>
+            <a:ext cx="3003177" cy="646331"/>
+          </a:xfrm>
+          <a:prstGeom prst="rect">
+            <a:avLst/>
+          </a:prstGeom>
+          <a:noFill/>
+        </p:spPr>
+        <p:txBody>
+          <a:bodyPr wrap="square">
+            <a:spAutoFit/>
+          </a:bodyPr>
+          <a:lstStyle/>
+          <a:p>
+            <a:pPr algn="dist"/>
+            <a:r>
+              <a:rPr lang="zh-TW" altLang="en-US" sz="3600" b="1" dirty="0">
+                <a:ln w="3175">
+                  <a:noFill/>
+                </a:ln>
+                <a:solidFill>
+                  <a:schemeClr val="bg1"/>
+                </a:solidFill>
+                <a:latin typeface="Microsoft YaHei UI" panose="020B0503020204020204" pitchFamily="34" charset="-122"/>
+                <a:ea typeface="Microsoft YaHei UI" panose="020B0503020204020204" pitchFamily="34" charset="-122"/>
+              </a:rPr>
+              <a:t>近期通報查詢</a:t>
+            </a:r>
+          </a:p>
+        </p:txBody>
+      </p:sp>
+      <p:sp>
+        <p:nvSpPr>
+          <p:cNvPr id="21" name="文字方塊 20">
+            <a:extLst>
+              <a:ext uri="{FF2B5EF4-FFF2-40B4-BE49-F238E27FC236}">
+                <a16:creationId xmlns:a16="http://schemas.microsoft.com/office/drawing/2014/main" id="{99874841-518C-A061-2AD7-DF65EC0C732E}"/>
+              </a:ext>
+            </a:extLst>
+          </p:cNvPr>
+          <p:cNvSpPr txBox="1"/>
+          <p:nvPr/>
+        </p:nvSpPr>
+        <p:spPr>
+          <a:xfrm>
+            <a:off x="505465" y="4632974"/>
+            <a:ext cx="3003177" cy="646331"/>
+          </a:xfrm>
+          <a:prstGeom prst="rect">
+            <a:avLst/>
+          </a:prstGeom>
+          <a:noFill/>
+        </p:spPr>
+        <p:txBody>
+          <a:bodyPr wrap="square">
+            <a:spAutoFit/>
+          </a:bodyPr>
+          <a:lstStyle/>
+          <a:p>
+            <a:pPr algn="dist"/>
+            <a:r>
+              <a:rPr lang="zh-TW" altLang="en-US" sz="3600" b="1" dirty="0">
+                <a:ln w="3175">
+                  <a:noFill/>
+                </a:ln>
+                <a:solidFill>
+                  <a:schemeClr val="accent6">
+                    <a:lumMod val="50000"/>
+                  </a:schemeClr>
+                </a:solidFill>
+                <a:latin typeface="Microsoft YaHei UI" panose="020B0503020204020204" pitchFamily="34" charset="-122"/>
+                <a:ea typeface="Microsoft YaHei UI" panose="020B0503020204020204" pitchFamily="34" charset="-122"/>
+              </a:rPr>
+              <a:t>年度通報查詢</a:t>
+            </a:r>
+          </a:p>
+        </p:txBody>
+      </p:sp>
+      <p:pic>
+        <p:nvPicPr>
+          <p:cNvPr id="5" name="圖形 4">
+            <a:extLst>
+              <a:ext uri="{FF2B5EF4-FFF2-40B4-BE49-F238E27FC236}">
+                <a16:creationId xmlns:a16="http://schemas.microsoft.com/office/drawing/2014/main" id="{662872C2-33ED-8A72-B3A2-A349D631D5CC}"/>
+              </a:ext>
+            </a:extLst>
+          </p:cNvPr>
+          <p:cNvPicPr>
+            <a:picLocks noChangeAspect="1"/>
+          </p:cNvPicPr>
+          <p:nvPr/>
+        </p:nvPicPr>
+        <p:blipFill>
+          <a:blip r:embed="rId5">
+            <a:extLst>
+              <a:ext uri="{28A0092B-C50C-407E-A947-70E740481C1C}">
+                <a14:useLocalDpi xmlns:a14="http://schemas.microsoft.com/office/drawing/2010/main" val="0"/>
+              </a:ext>
+              <a:ext uri="{96DAC541-7B7A-43D3-8B79-37D633B846F1}">
+                <asvg:svgBlip xmlns:asvg="http://schemas.microsoft.com/office/drawing/2016/SVG/main" r:embed="rId6"/>
+              </a:ext>
+            </a:extLst>
+          </a:blip>
+          <a:stretch>
+            <a:fillRect/>
+          </a:stretch>
+        </p:blipFill>
+        <p:spPr>
+          <a:xfrm>
+            <a:off x="4569767" y="1775026"/>
+            <a:ext cx="3042319" cy="3042319"/>
+          </a:xfrm>
+          <a:prstGeom prst="rect">
+            <a:avLst/>
+          </a:prstGeom>
+        </p:spPr>
+      </p:pic>
+      <p:pic>
+        <p:nvPicPr>
+          <p:cNvPr id="11" name="圖形 10">
+            <a:extLst>
+              <a:ext uri="{FF2B5EF4-FFF2-40B4-BE49-F238E27FC236}">
+                <a16:creationId xmlns:a16="http://schemas.microsoft.com/office/drawing/2014/main" id="{1B787AD5-F081-7285-8184-98E556762758}"/>
+              </a:ext>
+            </a:extLst>
+          </p:cNvPr>
+          <p:cNvPicPr>
+            <a:picLocks noChangeAspect="1"/>
+          </p:cNvPicPr>
+          <p:nvPr/>
+        </p:nvPicPr>
+        <p:blipFill>
+          <a:blip r:embed="rId7">
+            <a:extLst>
+              <a:ext uri="{28A0092B-C50C-407E-A947-70E740481C1C}">
+                <a14:useLocalDpi xmlns:a14="http://schemas.microsoft.com/office/drawing/2010/main" val="0"/>
+              </a:ext>
+              <a:ext uri="{96DAC541-7B7A-43D3-8B79-37D633B846F1}">
+                <asvg:svgBlip xmlns:asvg="http://schemas.microsoft.com/office/drawing/2016/SVG/main" r:embed="rId8"/>
+              </a:ext>
+            </a:extLst>
+          </a:blip>
+          <a:stretch>
+            <a:fillRect/>
+          </a:stretch>
+        </p:blipFill>
+        <p:spPr>
+          <a:xfrm>
+            <a:off x="8794372" y="1775026"/>
+            <a:ext cx="2781149" cy="2781149"/>
+          </a:xfrm>
+          <a:prstGeom prst="rect">
+            <a:avLst/>
+          </a:prstGeom>
+        </p:spPr>
+      </p:pic>
       <p:grpSp>
         <p:nvGrpSpPr>
-          <p:cNvPr id="15" name="群組 14">
-            <a:extLst>
-              <a:ext uri="{FF2B5EF4-FFF2-40B4-BE49-F238E27FC236}">
-                <a16:creationId xmlns:a16="http://schemas.microsoft.com/office/drawing/2014/main" id="{707AFFD4-67A1-7285-8219-E61766D859C9}"/>
+          <p:cNvPr id="24" name="群組 23">
+            <a:extLst>
+              <a:ext uri="{FF2B5EF4-FFF2-40B4-BE49-F238E27FC236}">
+                <a16:creationId xmlns:a16="http://schemas.microsoft.com/office/drawing/2014/main" id="{233D1125-414C-63D2-EDFE-F34CC1A81DDF}"/>
               </a:ext>
             </a:extLst>
           </p:cNvPr>
@@ -3594,65 +4674,18 @@
         </p:nvGrpSpPr>
         <p:grpSpPr>
           <a:xfrm>
-            <a:off x="8741321" y="2129596"/>
-            <a:ext cx="3277967" cy="3024688"/>
-            <a:chOff x="8593539" y="2083414"/>
-            <a:chExt cx="3277967" cy="3024688"/>
+            <a:off x="616479" y="1775026"/>
+            <a:ext cx="2781147" cy="2781147"/>
+            <a:chOff x="616479" y="1851827"/>
+            <a:chExt cx="2781147" cy="2781147"/>
           </a:xfrm>
         </p:grpSpPr>
-        <p:sp>
-          <p:nvSpPr>
-            <p:cNvPr id="11" name="文字方塊 10">
+        <p:pic>
+          <p:nvPicPr>
+            <p:cNvPr id="17" name="圖形 16">
               <a:extLst>
                 <a:ext uri="{FF2B5EF4-FFF2-40B4-BE49-F238E27FC236}">
-                  <a16:creationId xmlns:a16="http://schemas.microsoft.com/office/drawing/2014/main" id="{0DC09B49-ACF5-1D62-E01A-BA508E0BBAD9}"/>
-                </a:ext>
-              </a:extLst>
-            </p:cNvPr>
-            <p:cNvSpPr txBox="1"/>
-            <p:nvPr/>
-          </p:nvSpPr>
-          <p:spPr>
-            <a:xfrm>
-              <a:off x="8593539" y="4400216"/>
-              <a:ext cx="3277967" cy="707886"/>
-            </a:xfrm>
-            <a:prstGeom prst="rect">
-              <a:avLst/>
-            </a:prstGeom>
-            <a:noFill/>
-          </p:spPr>
-          <p:txBody>
-            <a:bodyPr wrap="square" rtlCol="0">
-              <a:spAutoFit/>
-            </a:bodyPr>
-            <a:lstStyle/>
-            <a:p>
-              <a:pPr algn="dist"/>
-              <a:r>
-                <a:rPr lang="zh-TW" altLang="en-US" sz="4000" b="1" dirty="0">
-                  <a:ln w="3175">
-                    <a:solidFill>
-                      <a:schemeClr val="tx1"/>
-                    </a:solidFill>
-                  </a:ln>
-                  <a:solidFill>
-                    <a:schemeClr val="bg1"/>
-                  </a:solidFill>
-                  <a:latin typeface="Microsoft YaHei UI" panose="020B0503020204020204" pitchFamily="34" charset="-122"/>
-                  <a:ea typeface="Microsoft YaHei UI" panose="020B0503020204020204" pitchFamily="34" charset="-122"/>
-                </a:rPr>
-                <a:t>巡檢相關圖資</a:t>
-              </a:r>
-            </a:p>
-          </p:txBody>
-        </p:sp>
-        <p:pic>
-          <p:nvPicPr>
-            <p:cNvPr id="4" name="圖片 3">
-              <a:extLst>
-                <a:ext uri="{FF2B5EF4-FFF2-40B4-BE49-F238E27FC236}">
-                  <a16:creationId xmlns:a16="http://schemas.microsoft.com/office/drawing/2014/main" id="{7C36EF35-816F-82CD-09CC-D369CF4C4480}"/>
+                  <a16:creationId xmlns:a16="http://schemas.microsoft.com/office/drawing/2014/main" id="{C137F8F4-2726-4AD9-75CA-EA5B72D70413}"/>
                 </a:ext>
               </a:extLst>
             </p:cNvPr>
@@ -3662,33 +4695,648 @@
             <p:nvPr/>
           </p:nvPicPr>
           <p:blipFill>
-            <a:blip r:embed="rId5"/>
+            <a:blip r:embed="rId9">
+              <a:extLst>
+                <a:ext uri="{28A0092B-C50C-407E-A947-70E740481C1C}">
+                  <a14:useLocalDpi xmlns:a14="http://schemas.microsoft.com/office/drawing/2010/main" val="0"/>
+                </a:ext>
+                <a:ext uri="{96DAC541-7B7A-43D3-8B79-37D633B846F1}">
+                  <asvg:svgBlip xmlns:asvg="http://schemas.microsoft.com/office/drawing/2016/SVG/main" r:embed="rId10"/>
+                </a:ext>
+              </a:extLst>
+            </a:blip>
             <a:stretch>
               <a:fillRect/>
             </a:stretch>
           </p:blipFill>
           <p:spPr>
             <a:xfrm>
-              <a:off x="9156113" y="2083414"/>
-              <a:ext cx="2089372" cy="2089372"/>
+              <a:off x="616479" y="1851827"/>
+              <a:ext cx="2781147" cy="2781147"/>
             </a:xfrm>
             <a:prstGeom prst="rect">
               <a:avLst/>
             </a:prstGeom>
-            <a:effectLst>
-              <a:glow rad="139700">
-                <a:schemeClr val="bg1">
-                  <a:alpha val="85000"/>
-                </a:schemeClr>
-              </a:glow>
-            </a:effectLst>
           </p:spPr>
         </p:pic>
+        <p:sp>
+          <p:nvSpPr>
+            <p:cNvPr id="23" name="文字方塊 22">
+              <a:extLst>
+                <a:ext uri="{FF2B5EF4-FFF2-40B4-BE49-F238E27FC236}">
+                  <a16:creationId xmlns:a16="http://schemas.microsoft.com/office/drawing/2014/main" id="{CF34A69E-6C07-A78B-23E5-1EDA1B0A2519}"/>
+                </a:ext>
+              </a:extLst>
+            </p:cNvPr>
+            <p:cNvSpPr txBox="1"/>
+            <p:nvPr/>
+          </p:nvSpPr>
+          <p:spPr>
+            <a:xfrm>
+              <a:off x="852105" y="2352127"/>
+              <a:ext cx="1474535" cy="646331"/>
+            </a:xfrm>
+            <a:prstGeom prst="rect">
+              <a:avLst/>
+            </a:prstGeom>
+            <a:noFill/>
+          </p:spPr>
+          <p:txBody>
+            <a:bodyPr wrap="square">
+              <a:spAutoFit/>
+            </a:bodyPr>
+            <a:lstStyle/>
+            <a:p>
+              <a:pPr algn="dist"/>
+              <a:r>
+                <a:rPr lang="en-US" altLang="zh-TW" sz="3600" b="1" dirty="0">
+                  <a:ln w="3175">
+                    <a:noFill/>
+                  </a:ln>
+                  <a:solidFill>
+                    <a:schemeClr val="accent6">
+                      <a:lumMod val="50000"/>
+                    </a:schemeClr>
+                  </a:solidFill>
+                  <a:latin typeface="Microsoft YaHei UI" panose="020B0503020204020204" pitchFamily="34" charset="-122"/>
+                  <a:ea typeface="Microsoft YaHei UI" panose="020B0503020204020204" pitchFamily="34" charset="-122"/>
+                </a:rPr>
+                <a:t>YEAR</a:t>
+              </a:r>
+              <a:endParaRPr lang="zh-TW" altLang="en-US" sz="3600" b="1" dirty="0">
+                <a:ln w="3175">
+                  <a:noFill/>
+                </a:ln>
+                <a:solidFill>
+                  <a:schemeClr val="accent6">
+                    <a:lumMod val="50000"/>
+                  </a:schemeClr>
+                </a:solidFill>
+                <a:latin typeface="Microsoft YaHei UI" panose="020B0503020204020204" pitchFamily="34" charset="-122"/>
+                <a:ea typeface="Microsoft YaHei UI" panose="020B0503020204020204" pitchFamily="34" charset="-122"/>
+              </a:endParaRPr>
+            </a:p>
+          </p:txBody>
+        </p:sp>
       </p:grpSp>
     </p:spTree>
     <p:extLst>
       <p:ext uri="{BB962C8B-B14F-4D97-AF65-F5344CB8AC3E}">
-        <p14:creationId xmlns:p14="http://schemas.microsoft.com/office/powerpoint/2010/main" val="2314412658"/>
+        <p14:creationId xmlns:p14="http://schemas.microsoft.com/office/powerpoint/2010/main" val="2760706211"/>
+      </p:ext>
+    </p:extLst>
+  </p:cSld>
+  <p:clrMapOvr>
+    <a:masterClrMapping/>
+  </p:clrMapOvr>
+</p:sld>
+</file>
+
+<file path=ppt/slides/slide4.xml><?xml version="1.0" encoding="utf-8"?>
+<p:sld xmlns:a="http://schemas.openxmlformats.org/drawingml/2006/main" xmlns:r="http://schemas.openxmlformats.org/officeDocument/2006/relationships" xmlns:p="http://schemas.openxmlformats.org/presentationml/2006/main">
+  <p:cSld>
+    <p:spTree>
+      <p:nvGrpSpPr>
+        <p:cNvPr id="1" name=""/>
+        <p:cNvGrpSpPr/>
+        <p:nvPr/>
+      </p:nvGrpSpPr>
+      <p:grpSpPr>
+        <a:xfrm>
+          <a:off x="0" y="0"/>
+          <a:ext cx="0" cy="0"/>
+          <a:chOff x="0" y="0"/>
+          <a:chExt cx="0" cy="0"/>
+        </a:xfrm>
+      </p:grpSpPr>
+      <p:pic>
+        <p:nvPicPr>
+          <p:cNvPr id="15" name="圖片 14" descr="一張含有 行, 綠色, 圖表, 螢幕擷取畫面 的圖片&#10;&#10;自動產生的描述">
+            <a:extLst>
+              <a:ext uri="{FF2B5EF4-FFF2-40B4-BE49-F238E27FC236}">
+                <a16:creationId xmlns:a16="http://schemas.microsoft.com/office/drawing/2014/main" id="{BDF78EEE-BF2E-EC75-1F65-831C85742098}"/>
+              </a:ext>
+            </a:extLst>
+          </p:cNvPr>
+          <p:cNvPicPr>
+            <a:picLocks noChangeAspect="1"/>
+          </p:cNvPicPr>
+          <p:nvPr/>
+        </p:nvPicPr>
+        <p:blipFill>
+          <a:blip r:embed="rId2">
+            <a:extLst>
+              <a:ext uri="{28A0092B-C50C-407E-A947-70E740481C1C}">
+                <a14:useLocalDpi xmlns:a14="http://schemas.microsoft.com/office/drawing/2010/main" val="0"/>
+              </a:ext>
+            </a:extLst>
+          </a:blip>
+          <a:stretch>
+            <a:fillRect/>
+          </a:stretch>
+        </p:blipFill>
+        <p:spPr>
+          <a:xfrm>
+            <a:off x="0" y="1515084"/>
+            <a:ext cx="12192000" cy="4111142"/>
+          </a:xfrm>
+          <a:prstGeom prst="rect">
+            <a:avLst/>
+          </a:prstGeom>
+        </p:spPr>
+      </p:pic>
+      <p:sp>
+        <p:nvSpPr>
+          <p:cNvPr id="22" name="矩形 21">
+            <a:extLst>
+              <a:ext uri="{FF2B5EF4-FFF2-40B4-BE49-F238E27FC236}">
+                <a16:creationId xmlns:a16="http://schemas.microsoft.com/office/drawing/2014/main" id="{22AF012F-5BFE-E55E-6D3B-217BCDD846C4}"/>
+              </a:ext>
+            </a:extLst>
+          </p:cNvPr>
+          <p:cNvSpPr/>
+          <p:nvPr/>
+        </p:nvSpPr>
+        <p:spPr>
+          <a:xfrm>
+            <a:off x="0" y="1515084"/>
+            <a:ext cx="12192000" cy="4111142"/>
+          </a:xfrm>
+          <a:prstGeom prst="rect">
+            <a:avLst/>
+          </a:prstGeom>
+          <a:solidFill>
+            <a:srgbClr val="F19759"/>
+          </a:solidFill>
+          <a:ln>
+            <a:noFill/>
+          </a:ln>
+        </p:spPr>
+        <p:style>
+          <a:lnRef idx="2">
+            <a:schemeClr val="accent1">
+              <a:shade val="15000"/>
+            </a:schemeClr>
+          </a:lnRef>
+          <a:fillRef idx="1">
+            <a:schemeClr val="accent1"/>
+          </a:fillRef>
+          <a:effectRef idx="0">
+            <a:schemeClr val="accent1"/>
+          </a:effectRef>
+          <a:fontRef idx="minor">
+            <a:schemeClr val="lt1"/>
+          </a:fontRef>
+        </p:style>
+        <p:txBody>
+          <a:bodyPr rtlCol="0" anchor="ctr"/>
+          <a:lstStyle/>
+          <a:p>
+            <a:pPr algn="ctr"/>
+            <a:endParaRPr lang="zh-TW" altLang="en-US"/>
+          </a:p>
+        </p:txBody>
+      </p:sp>
+      <p:pic>
+        <p:nvPicPr>
+          <p:cNvPr id="4" name="圖形 3">
+            <a:extLst>
+              <a:ext uri="{FF2B5EF4-FFF2-40B4-BE49-F238E27FC236}">
+                <a16:creationId xmlns:a16="http://schemas.microsoft.com/office/drawing/2014/main" id="{DD78FA61-5221-EC8E-246B-9AA0FD4B778D}"/>
+              </a:ext>
+            </a:extLst>
+          </p:cNvPr>
+          <p:cNvPicPr>
+            <a:picLocks noChangeAspect="1"/>
+          </p:cNvPicPr>
+          <p:nvPr/>
+        </p:nvPicPr>
+        <p:blipFill>
+          <a:blip r:embed="rId3">
+            <a:extLst>
+              <a:ext uri="{28A0092B-C50C-407E-A947-70E740481C1C}">
+                <a14:useLocalDpi xmlns:a14="http://schemas.microsoft.com/office/drawing/2010/main" val="0"/>
+              </a:ext>
+              <a:ext uri="{96DAC541-7B7A-43D3-8B79-37D633B846F1}">
+                <asvg:svgBlip xmlns:asvg="http://schemas.microsoft.com/office/drawing/2016/SVG/main" r:embed="rId4"/>
+              </a:ext>
+            </a:extLst>
+          </a:blip>
+          <a:stretch>
+            <a:fillRect/>
+          </a:stretch>
+        </p:blipFill>
+        <p:spPr>
+          <a:xfrm>
+            <a:off x="4965101" y="2258225"/>
+            <a:ext cx="2164977" cy="2164977"/>
+          </a:xfrm>
+          <a:prstGeom prst="rect">
+            <a:avLst/>
+          </a:prstGeom>
+        </p:spPr>
+      </p:pic>
+      <p:sp>
+        <p:nvSpPr>
+          <p:cNvPr id="13" name="文字方塊 12">
+            <a:extLst>
+              <a:ext uri="{FF2B5EF4-FFF2-40B4-BE49-F238E27FC236}">
+                <a16:creationId xmlns:a16="http://schemas.microsoft.com/office/drawing/2014/main" id="{43DE5DB1-6B64-D373-7EB5-C5D4BFBCBF92}"/>
+              </a:ext>
+            </a:extLst>
+          </p:cNvPr>
+          <p:cNvSpPr txBox="1"/>
+          <p:nvPr/>
+        </p:nvSpPr>
+        <p:spPr>
+          <a:xfrm>
+            <a:off x="8683357" y="4632974"/>
+            <a:ext cx="3003177" cy="646331"/>
+          </a:xfrm>
+          <a:prstGeom prst="rect">
+            <a:avLst/>
+          </a:prstGeom>
+          <a:noFill/>
+        </p:spPr>
+        <p:txBody>
+          <a:bodyPr wrap="square">
+            <a:spAutoFit/>
+          </a:bodyPr>
+          <a:lstStyle/>
+          <a:p>
+            <a:pPr algn="dist"/>
+            <a:r>
+              <a:rPr lang="zh-TW" altLang="en-US" sz="3600" b="1" dirty="0">
+                <a:ln w="3175">
+                  <a:noFill/>
+                </a:ln>
+                <a:solidFill>
+                  <a:schemeClr val="tx1">
+                    <a:lumMod val="85000"/>
+                    <a:lumOff val="15000"/>
+                  </a:schemeClr>
+                </a:solidFill>
+                <a:latin typeface="Microsoft YaHei UI" panose="020B0503020204020204" pitchFamily="34" charset="-122"/>
+                <a:ea typeface="Microsoft YaHei UI" panose="020B0503020204020204" pitchFamily="34" charset="-122"/>
+              </a:rPr>
+              <a:t>日常巡檢時數</a:t>
+            </a:r>
+          </a:p>
+        </p:txBody>
+      </p:sp>
+      <p:sp>
+        <p:nvSpPr>
+          <p:cNvPr id="20" name="文字方塊 19">
+            <a:extLst>
+              <a:ext uri="{FF2B5EF4-FFF2-40B4-BE49-F238E27FC236}">
+                <a16:creationId xmlns:a16="http://schemas.microsoft.com/office/drawing/2014/main" id="{CAF2E575-7779-F1A8-608D-3B2DCC9F8A66}"/>
+              </a:ext>
+            </a:extLst>
+          </p:cNvPr>
+          <p:cNvSpPr txBox="1"/>
+          <p:nvPr/>
+        </p:nvSpPr>
+        <p:spPr>
+          <a:xfrm>
+            <a:off x="4589339" y="4632974"/>
+            <a:ext cx="3003177" cy="646331"/>
+          </a:xfrm>
+          <a:prstGeom prst="rect">
+            <a:avLst/>
+          </a:prstGeom>
+          <a:noFill/>
+        </p:spPr>
+        <p:txBody>
+          <a:bodyPr wrap="square">
+            <a:spAutoFit/>
+          </a:bodyPr>
+          <a:lstStyle/>
+          <a:p>
+            <a:pPr algn="dist"/>
+            <a:r>
+              <a:rPr lang="zh-TW" altLang="en-US" sz="3600" b="1" dirty="0">
+                <a:ln w="3175">
+                  <a:noFill/>
+                </a:ln>
+                <a:solidFill>
+                  <a:schemeClr val="tx1">
+                    <a:lumMod val="85000"/>
+                    <a:lumOff val="15000"/>
+                  </a:schemeClr>
+                </a:solidFill>
+                <a:latin typeface="Microsoft YaHei UI" panose="020B0503020204020204" pitchFamily="34" charset="-122"/>
+                <a:ea typeface="Microsoft YaHei UI" panose="020B0503020204020204" pitchFamily="34" charset="-122"/>
+              </a:rPr>
+              <a:t>近期通報查詢</a:t>
+            </a:r>
+          </a:p>
+        </p:txBody>
+      </p:sp>
+      <p:sp>
+        <p:nvSpPr>
+          <p:cNvPr id="21" name="文字方塊 20">
+            <a:extLst>
+              <a:ext uri="{FF2B5EF4-FFF2-40B4-BE49-F238E27FC236}">
+                <a16:creationId xmlns:a16="http://schemas.microsoft.com/office/drawing/2014/main" id="{99874841-518C-A061-2AD7-DF65EC0C732E}"/>
+              </a:ext>
+            </a:extLst>
+          </p:cNvPr>
+          <p:cNvSpPr txBox="1"/>
+          <p:nvPr/>
+        </p:nvSpPr>
+        <p:spPr>
+          <a:xfrm>
+            <a:off x="505465" y="4632974"/>
+            <a:ext cx="3003177" cy="646331"/>
+          </a:xfrm>
+          <a:prstGeom prst="rect">
+            <a:avLst/>
+          </a:prstGeom>
+          <a:noFill/>
+        </p:spPr>
+        <p:txBody>
+          <a:bodyPr wrap="square">
+            <a:spAutoFit/>
+          </a:bodyPr>
+          <a:lstStyle/>
+          <a:p>
+            <a:pPr algn="dist"/>
+            <a:r>
+              <a:rPr lang="zh-TW" altLang="en-US" sz="3600" b="1" dirty="0">
+                <a:ln w="3175">
+                  <a:noFill/>
+                </a:ln>
+                <a:solidFill>
+                  <a:schemeClr val="tx1">
+                    <a:lumMod val="85000"/>
+                    <a:lumOff val="15000"/>
+                  </a:schemeClr>
+                </a:solidFill>
+                <a:latin typeface="Microsoft YaHei UI" panose="020B0503020204020204" pitchFamily="34" charset="-122"/>
+                <a:ea typeface="Microsoft YaHei UI" panose="020B0503020204020204" pitchFamily="34" charset="-122"/>
+              </a:rPr>
+              <a:t>年度通報查詢</a:t>
+            </a:r>
+          </a:p>
+        </p:txBody>
+      </p:sp>
+      <p:pic>
+        <p:nvPicPr>
+          <p:cNvPr id="5" name="圖形 4">
+            <a:extLst>
+              <a:ext uri="{FF2B5EF4-FFF2-40B4-BE49-F238E27FC236}">
+                <a16:creationId xmlns:a16="http://schemas.microsoft.com/office/drawing/2014/main" id="{662872C2-33ED-8A72-B3A2-A349D631D5CC}"/>
+              </a:ext>
+            </a:extLst>
+          </p:cNvPr>
+          <p:cNvPicPr>
+            <a:picLocks noChangeAspect="1"/>
+          </p:cNvPicPr>
+          <p:nvPr/>
+        </p:nvPicPr>
+        <p:blipFill>
+          <a:blip r:embed="rId5">
+            <a:extLst>
+              <a:ext uri="{28A0092B-C50C-407E-A947-70E740481C1C}">
+                <a14:useLocalDpi xmlns:a14="http://schemas.microsoft.com/office/drawing/2010/main" val="0"/>
+              </a:ext>
+              <a:ext uri="{96DAC541-7B7A-43D3-8B79-37D633B846F1}">
+                <asvg:svgBlip xmlns:asvg="http://schemas.microsoft.com/office/drawing/2016/SVG/main" r:embed="rId6"/>
+              </a:ext>
+            </a:extLst>
+          </a:blip>
+          <a:stretch>
+            <a:fillRect/>
+          </a:stretch>
+        </p:blipFill>
+        <p:spPr>
+          <a:xfrm>
+            <a:off x="4569767" y="1775026"/>
+            <a:ext cx="3042319" cy="3042319"/>
+          </a:xfrm>
+          <a:prstGeom prst="rect">
+            <a:avLst/>
+          </a:prstGeom>
+        </p:spPr>
+      </p:pic>
+      <p:pic>
+        <p:nvPicPr>
+          <p:cNvPr id="11" name="圖形 10">
+            <a:extLst>
+              <a:ext uri="{FF2B5EF4-FFF2-40B4-BE49-F238E27FC236}">
+                <a16:creationId xmlns:a16="http://schemas.microsoft.com/office/drawing/2014/main" id="{1B787AD5-F081-7285-8184-98E556762758}"/>
+              </a:ext>
+            </a:extLst>
+          </p:cNvPr>
+          <p:cNvPicPr>
+            <a:picLocks noChangeAspect="1"/>
+          </p:cNvPicPr>
+          <p:nvPr/>
+        </p:nvPicPr>
+        <p:blipFill>
+          <a:blip r:embed="rId7">
+            <a:extLst>
+              <a:ext uri="{28A0092B-C50C-407E-A947-70E740481C1C}">
+                <a14:useLocalDpi xmlns:a14="http://schemas.microsoft.com/office/drawing/2010/main" val="0"/>
+              </a:ext>
+              <a:ext uri="{96DAC541-7B7A-43D3-8B79-37D633B846F1}">
+                <asvg:svgBlip xmlns:asvg="http://schemas.microsoft.com/office/drawing/2016/SVG/main" r:embed="rId8"/>
+              </a:ext>
+            </a:extLst>
+          </a:blip>
+          <a:stretch>
+            <a:fillRect/>
+          </a:stretch>
+        </p:blipFill>
+        <p:spPr>
+          <a:xfrm>
+            <a:off x="8794372" y="1775026"/>
+            <a:ext cx="2781149" cy="2781149"/>
+          </a:xfrm>
+          <a:prstGeom prst="rect">
+            <a:avLst/>
+          </a:prstGeom>
+        </p:spPr>
+      </p:pic>
+      <p:grpSp>
+        <p:nvGrpSpPr>
+          <p:cNvPr id="24" name="群組 23">
+            <a:extLst>
+              <a:ext uri="{FF2B5EF4-FFF2-40B4-BE49-F238E27FC236}">
+                <a16:creationId xmlns:a16="http://schemas.microsoft.com/office/drawing/2014/main" id="{233D1125-414C-63D2-EDFE-F34CC1A81DDF}"/>
+              </a:ext>
+            </a:extLst>
+          </p:cNvPr>
+          <p:cNvGrpSpPr/>
+          <p:nvPr/>
+        </p:nvGrpSpPr>
+        <p:grpSpPr>
+          <a:xfrm>
+            <a:off x="616479" y="1775026"/>
+            <a:ext cx="2781147" cy="2781147"/>
+            <a:chOff x="616479" y="1851827"/>
+            <a:chExt cx="2781147" cy="2781147"/>
+          </a:xfrm>
+        </p:grpSpPr>
+        <p:pic>
+          <p:nvPicPr>
+            <p:cNvPr id="17" name="圖形 16">
+              <a:extLst>
+                <a:ext uri="{FF2B5EF4-FFF2-40B4-BE49-F238E27FC236}">
+                  <a16:creationId xmlns:a16="http://schemas.microsoft.com/office/drawing/2014/main" id="{C137F8F4-2726-4AD9-75CA-EA5B72D70413}"/>
+                </a:ext>
+              </a:extLst>
+            </p:cNvPr>
+            <p:cNvPicPr>
+              <a:picLocks noChangeAspect="1"/>
+            </p:cNvPicPr>
+            <p:nvPr/>
+          </p:nvPicPr>
+          <p:blipFill>
+            <a:blip r:embed="rId9">
+              <a:extLst>
+                <a:ext uri="{28A0092B-C50C-407E-A947-70E740481C1C}">
+                  <a14:useLocalDpi xmlns:a14="http://schemas.microsoft.com/office/drawing/2010/main" val="0"/>
+                </a:ext>
+                <a:ext uri="{96DAC541-7B7A-43D3-8B79-37D633B846F1}">
+                  <asvg:svgBlip xmlns:asvg="http://schemas.microsoft.com/office/drawing/2016/SVG/main" r:embed="rId10"/>
+                </a:ext>
+              </a:extLst>
+            </a:blip>
+            <a:stretch>
+              <a:fillRect/>
+            </a:stretch>
+          </p:blipFill>
+          <p:spPr>
+            <a:xfrm>
+              <a:off x="616479" y="1851827"/>
+              <a:ext cx="2781147" cy="2781147"/>
+            </a:xfrm>
+            <a:prstGeom prst="rect">
+              <a:avLst/>
+            </a:prstGeom>
+          </p:spPr>
+        </p:pic>
+        <p:sp>
+          <p:nvSpPr>
+            <p:cNvPr id="23" name="文字方塊 22">
+              <a:extLst>
+                <a:ext uri="{FF2B5EF4-FFF2-40B4-BE49-F238E27FC236}">
+                  <a16:creationId xmlns:a16="http://schemas.microsoft.com/office/drawing/2014/main" id="{CF34A69E-6C07-A78B-23E5-1EDA1B0A2519}"/>
+                </a:ext>
+              </a:extLst>
+            </p:cNvPr>
+            <p:cNvSpPr txBox="1"/>
+            <p:nvPr/>
+          </p:nvSpPr>
+          <p:spPr>
+            <a:xfrm>
+              <a:off x="852105" y="2352127"/>
+              <a:ext cx="1474535" cy="646331"/>
+            </a:xfrm>
+            <a:prstGeom prst="rect">
+              <a:avLst/>
+            </a:prstGeom>
+            <a:noFill/>
+          </p:spPr>
+          <p:txBody>
+            <a:bodyPr wrap="square">
+              <a:spAutoFit/>
+            </a:bodyPr>
+            <a:lstStyle/>
+            <a:p>
+              <a:pPr algn="dist"/>
+              <a:r>
+                <a:rPr lang="en-US" altLang="zh-TW" sz="3600" b="1" dirty="0">
+                  <a:ln w="3175">
+                    <a:noFill/>
+                  </a:ln>
+                  <a:solidFill>
+                    <a:schemeClr val="accent6">
+                      <a:lumMod val="50000"/>
+                    </a:schemeClr>
+                  </a:solidFill>
+                  <a:latin typeface="Microsoft YaHei UI" panose="020B0503020204020204" pitchFamily="34" charset="-122"/>
+                  <a:ea typeface="Microsoft YaHei UI" panose="020B0503020204020204" pitchFamily="34" charset="-122"/>
+                </a:rPr>
+                <a:t>YEAR</a:t>
+              </a:r>
+              <a:endParaRPr lang="zh-TW" altLang="en-US" sz="3600" b="1" dirty="0">
+                <a:ln w="3175">
+                  <a:noFill/>
+                </a:ln>
+                <a:solidFill>
+                  <a:schemeClr val="accent6">
+                    <a:lumMod val="50000"/>
+                  </a:schemeClr>
+                </a:solidFill>
+                <a:latin typeface="Microsoft YaHei UI" panose="020B0503020204020204" pitchFamily="34" charset="-122"/>
+                <a:ea typeface="Microsoft YaHei UI" panose="020B0503020204020204" pitchFamily="34" charset="-122"/>
+              </a:endParaRPr>
+            </a:p>
+          </p:txBody>
+        </p:sp>
+      </p:grpSp>
+      <p:sp>
+        <p:nvSpPr>
+          <p:cNvPr id="3" name="矩形: 圓角 2">
+            <a:extLst>
+              <a:ext uri="{FF2B5EF4-FFF2-40B4-BE49-F238E27FC236}">
+                <a16:creationId xmlns:a16="http://schemas.microsoft.com/office/drawing/2014/main" id="{0D2D659B-A9E1-8204-7EF2-AA39020B99EC}"/>
+              </a:ext>
+            </a:extLst>
+          </p:cNvPr>
+          <p:cNvSpPr>
+            <a:spLocks noChangeAspect="1"/>
+          </p:cNvSpPr>
+          <p:nvPr/>
+        </p:nvSpPr>
+        <p:spPr>
+          <a:xfrm>
+            <a:off x="27054" y="1590655"/>
+            <a:ext cx="3960000" cy="3960000"/>
+          </a:xfrm>
+          <a:prstGeom prst="roundRect">
+            <a:avLst>
+              <a:gd name="adj" fmla="val 8179"/>
+            </a:avLst>
+          </a:prstGeom>
+          <a:noFill/>
+          <a:ln>
+            <a:noFill/>
+          </a:ln>
+        </p:spPr>
+        <p:style>
+          <a:lnRef idx="2">
+            <a:schemeClr val="accent4"/>
+          </a:lnRef>
+          <a:fillRef idx="1">
+            <a:schemeClr val="lt1"/>
+          </a:fillRef>
+          <a:effectRef idx="0">
+            <a:schemeClr val="accent4"/>
+          </a:effectRef>
+          <a:fontRef idx="minor">
+            <a:schemeClr val="dk1"/>
+          </a:fontRef>
+        </p:style>
+        <p:txBody>
+          <a:bodyPr rtlCol="0" anchor="ctr"/>
+          <a:lstStyle/>
+          <a:p>
+            <a:pPr algn="ctr"/>
+            <a:endParaRPr lang="zh-TW" altLang="en-US">
+              <a:solidFill>
+                <a:srgbClr val="2F5597"/>
+              </a:solidFill>
+            </a:endParaRPr>
+          </a:p>
+        </p:txBody>
+      </p:sp>
+    </p:spTree>
+    <p:extLst>
+      <p:ext uri="{BB962C8B-B14F-4D97-AF65-F5344CB8AC3E}">
+        <p14:creationId xmlns:p14="http://schemas.microsoft.com/office/powerpoint/2010/main" val="2818589411"/>
       </p:ext>
     </p:extLst>
   </p:cSld>

</xml_diff>